<commit_message>
Apply small wording fixes in IntroToNode demo. Add a new slide to IntroToNodeJS presentation.
</commit_message>
<xml_diff>
--- a/Presentation/IntroToNodeJS/IntroToNodeJS.pptx
+++ b/Presentation/IntroToNodeJS/IntroToNodeJS.pptx
@@ -17,10 +17,10 @@
     <p:sldMasterId id="2147483782" r:id="rId16"/>
   </p:sldMasterIdLst>
   <p:notesMasterIdLst>
-    <p:notesMasterId r:id="rId55"/>
+    <p:notesMasterId r:id="rId56"/>
   </p:notesMasterIdLst>
   <p:handoutMasterIdLst>
-    <p:handoutMasterId r:id="rId56"/>
+    <p:handoutMasterId r:id="rId57"/>
   </p:handoutMasterIdLst>
   <p:sldIdLst>
     <p:sldId id="330" r:id="rId17"/>
@@ -59,8 +59,9 @@
     <p:sldId id="317" r:id="rId50"/>
     <p:sldId id="318" r:id="rId51"/>
     <p:sldId id="319" r:id="rId52"/>
-    <p:sldId id="311" r:id="rId53"/>
-    <p:sldId id="269" r:id="rId54"/>
+    <p:sldId id="334" r:id="rId53"/>
+    <p:sldId id="311" r:id="rId54"/>
+    <p:sldId id="269" r:id="rId55"/>
   </p:sldIdLst>
   <p:sldSz cx="12192000" cy="6858000"/>
   <p:notesSz cx="9144000" cy="6858000"/>
@@ -264,7 +265,7 @@
           <a:p>
             <a:fld id="{312E7B4A-039C-48A2-9B2C-AF16AA3873D8}" type="datetimeFigureOut">
               <a:rPr lang="en-US" smtClean="0"/>
-              <a:t>7/21/2015</a:t>
+              <a:t>7/22/2015</a:t>
             </a:fld>
             <a:endParaRPr lang="en-US"/>
           </a:p>
@@ -429,7 +430,7 @@
           <a:p>
             <a:fld id="{DA005A0C-54D9-45AA-87D4-C551D08DFCE1}" type="datetimeFigureOut">
               <a:rPr lang="en-US" smtClean="0"/>
-              <a:t>7/21/2015</a:t>
+              <a:t>7/22/2015</a:t>
             </a:fld>
             <a:endParaRPr lang="en-US"/>
           </a:p>
@@ -2238,6 +2239,247 @@
     <p:extLst>
       <p:ext uri="{BB962C8B-B14F-4D97-AF65-F5344CB8AC3E}">
         <p14:creationId xmlns:p14="http://schemas.microsoft.com/office/powerpoint/2010/main" val="1050790002"/>
+      </p:ext>
+    </p:extLst>
+  </p:cSld>
+  <p:clrMapOvr>
+    <a:masterClrMapping/>
+  </p:clrMapOvr>
+  <p:timing>
+    <p:tnLst>
+      <p:par>
+        <p:cTn id="1" dur="indefinite" restart="never" nodeType="tmRoot"/>
+      </p:par>
+    </p:tnLst>
+  </p:timing>
+</p:sldLayout>
+</file>
+
+<file path=ppt/slideLayouts/slideLayout100.xml><?xml version="1.0" encoding="utf-8"?>
+<p:sldLayout xmlns:a="http://schemas.openxmlformats.org/drawingml/2006/main" xmlns:r="http://schemas.openxmlformats.org/officeDocument/2006/relationships" xmlns:p="http://schemas.openxmlformats.org/presentationml/2006/main" type="objTx" preserve="1">
+  <p:cSld name="Content with Caption">
+    <p:bg>
+      <p:bgPr>
+        <a:solidFill>
+          <a:schemeClr val="tx1"/>
+        </a:solidFill>
+        <a:effectLst/>
+      </p:bgPr>
+    </p:bg>
+    <p:spTree>
+      <p:nvGrpSpPr>
+        <p:cNvPr id="1" name=""/>
+        <p:cNvGrpSpPr/>
+        <p:nvPr/>
+      </p:nvGrpSpPr>
+      <p:grpSpPr>
+        <a:xfrm>
+          <a:off x="0" y="0"/>
+          <a:ext cx="0" cy="0"/>
+          <a:chOff x="0" y="0"/>
+          <a:chExt cx="0" cy="0"/>
+        </a:xfrm>
+      </p:grpSpPr>
+      <p:sp>
+        <p:nvSpPr>
+          <p:cNvPr id="2" name="Title 1"/>
+          <p:cNvSpPr>
+            <a:spLocks noGrp="1"/>
+          </p:cNvSpPr>
+          <p:nvPr>
+            <p:ph type="title"/>
+          </p:nvPr>
+        </p:nvSpPr>
+        <p:spPr>
+          <a:xfrm>
+            <a:off x="560798" y="457199"/>
+            <a:ext cx="4211227" cy="1936679"/>
+          </a:xfrm>
+        </p:spPr>
+        <p:txBody>
+          <a:bodyPr anchor="b">
+            <a:noAutofit/>
+          </a:bodyPr>
+          <a:lstStyle>
+            <a:lvl1pPr>
+              <a:defRPr sz="4000"/>
+            </a:lvl1pPr>
+          </a:lstStyle>
+          <a:p>
+            <a:r>
+              <a:rPr lang="en-US" smtClean="0"/>
+              <a:t>Click to edit Master title style</a:t>
+            </a:r>
+            <a:endParaRPr lang="en-US"/>
+          </a:p>
+        </p:txBody>
+      </p:sp>
+      <p:sp>
+        <p:nvSpPr>
+          <p:cNvPr id="3" name="Content Placeholder 2"/>
+          <p:cNvSpPr>
+            <a:spLocks noGrp="1"/>
+          </p:cNvSpPr>
+          <p:nvPr>
+            <p:ph idx="1"/>
+          </p:nvPr>
+        </p:nvSpPr>
+        <p:spPr>
+          <a:xfrm>
+            <a:off x="5183188" y="987425"/>
+            <a:ext cx="6457432" cy="4873625"/>
+          </a:xfrm>
+        </p:spPr>
+        <p:txBody>
+          <a:bodyPr/>
+          <a:lstStyle>
+            <a:lvl1pPr>
+              <a:defRPr sz="3200">
+                <a:latin typeface="+mj-lt"/>
+              </a:defRPr>
+            </a:lvl1pPr>
+            <a:lvl2pPr>
+              <a:defRPr sz="2800">
+                <a:latin typeface="+mj-lt"/>
+              </a:defRPr>
+            </a:lvl2pPr>
+            <a:lvl3pPr>
+              <a:defRPr sz="2400">
+                <a:latin typeface="+mj-lt"/>
+              </a:defRPr>
+            </a:lvl3pPr>
+            <a:lvl4pPr>
+              <a:defRPr sz="2000">
+                <a:latin typeface="+mj-lt"/>
+              </a:defRPr>
+            </a:lvl4pPr>
+            <a:lvl5pPr>
+              <a:defRPr sz="2000">
+                <a:latin typeface="+mj-lt"/>
+              </a:defRPr>
+            </a:lvl5pPr>
+            <a:lvl6pPr>
+              <a:defRPr sz="2000"/>
+            </a:lvl6pPr>
+            <a:lvl7pPr>
+              <a:defRPr sz="2000"/>
+            </a:lvl7pPr>
+            <a:lvl8pPr>
+              <a:defRPr sz="2000"/>
+            </a:lvl8pPr>
+            <a:lvl9pPr>
+              <a:defRPr sz="2000"/>
+            </a:lvl9pPr>
+          </a:lstStyle>
+          <a:p>
+            <a:pPr lvl="0"/>
+            <a:r>
+              <a:rPr lang="en-US" smtClean="0"/>
+              <a:t>Click to edit Master text styles</a:t>
+            </a:r>
+          </a:p>
+          <a:p>
+            <a:pPr lvl="1"/>
+            <a:r>
+              <a:rPr lang="en-US" smtClean="0"/>
+              <a:t>Second level</a:t>
+            </a:r>
+          </a:p>
+          <a:p>
+            <a:pPr lvl="2"/>
+            <a:r>
+              <a:rPr lang="en-US" smtClean="0"/>
+              <a:t>Third level</a:t>
+            </a:r>
+          </a:p>
+          <a:p>
+            <a:pPr lvl="3"/>
+            <a:r>
+              <a:rPr lang="en-US" smtClean="0"/>
+              <a:t>Fourth level</a:t>
+            </a:r>
+          </a:p>
+          <a:p>
+            <a:pPr lvl="4"/>
+            <a:r>
+              <a:rPr lang="en-US" smtClean="0"/>
+              <a:t>Fifth level</a:t>
+            </a:r>
+            <a:endParaRPr lang="en-US"/>
+          </a:p>
+        </p:txBody>
+      </p:sp>
+      <p:sp>
+        <p:nvSpPr>
+          <p:cNvPr id="4" name="Text Placeholder 3"/>
+          <p:cNvSpPr>
+            <a:spLocks noGrp="1"/>
+          </p:cNvSpPr>
+          <p:nvPr>
+            <p:ph type="body" sz="half" idx="2"/>
+          </p:nvPr>
+        </p:nvSpPr>
+        <p:spPr>
+          <a:xfrm>
+            <a:off x="560798" y="2604070"/>
+            <a:ext cx="4211227" cy="3264917"/>
+          </a:xfrm>
+        </p:spPr>
+        <p:txBody>
+          <a:bodyPr>
+            <a:normAutofit/>
+          </a:bodyPr>
+          <a:lstStyle>
+            <a:lvl1pPr marL="0" indent="0">
+              <a:buNone/>
+              <a:defRPr sz="2000"/>
+            </a:lvl1pPr>
+            <a:lvl2pPr marL="457200" indent="0">
+              <a:buNone/>
+              <a:defRPr sz="1400"/>
+            </a:lvl2pPr>
+            <a:lvl3pPr marL="914400" indent="0">
+              <a:buNone/>
+              <a:defRPr sz="1200"/>
+            </a:lvl3pPr>
+            <a:lvl4pPr marL="1371600" indent="0">
+              <a:buNone/>
+              <a:defRPr sz="1000"/>
+            </a:lvl4pPr>
+            <a:lvl5pPr marL="1828800" indent="0">
+              <a:buNone/>
+              <a:defRPr sz="1000"/>
+            </a:lvl5pPr>
+            <a:lvl6pPr marL="2286000" indent="0">
+              <a:buNone/>
+              <a:defRPr sz="1000"/>
+            </a:lvl6pPr>
+            <a:lvl7pPr marL="2743200" indent="0">
+              <a:buNone/>
+              <a:defRPr sz="1000"/>
+            </a:lvl7pPr>
+            <a:lvl8pPr marL="3200400" indent="0">
+              <a:buNone/>
+              <a:defRPr sz="1000"/>
+            </a:lvl8pPr>
+            <a:lvl9pPr marL="3657600" indent="0">
+              <a:buNone/>
+              <a:defRPr sz="1000"/>
+            </a:lvl9pPr>
+          </a:lstStyle>
+          <a:p>
+            <a:pPr lvl="0"/>
+            <a:r>
+              <a:rPr lang="en-US" smtClean="0"/>
+              <a:t>Click to edit Master text styles</a:t>
+            </a:r>
+          </a:p>
+        </p:txBody>
+      </p:sp>
+    </p:spTree>
+    <p:extLst>
+      <p:ext uri="{BB962C8B-B14F-4D97-AF65-F5344CB8AC3E}">
+        <p14:creationId xmlns:p14="http://schemas.microsoft.com/office/powerpoint/2010/main" val="3579493188"/>
       </p:ext>
     </p:extLst>
   </p:cSld>
@@ -14777,6 +15019,134 @@
 </file>
 
 <file path=ppt/slideLayouts/slideLayout65.xml><?xml version="1.0" encoding="utf-8"?>
+<p:sldLayout xmlns:a="http://schemas.openxmlformats.org/drawingml/2006/main" xmlns:r="http://schemas.openxmlformats.org/officeDocument/2006/relationships" xmlns:p="http://schemas.openxmlformats.org/presentationml/2006/main" userDrawn="1">
+  <p:cSld name="1_Demo">
+    <p:bg>
+      <p:bgPr>
+        <a:solidFill>
+          <a:srgbClr val="3C454F"/>
+        </a:solidFill>
+        <a:effectLst/>
+      </p:bgPr>
+    </p:bg>
+    <p:spTree>
+      <p:nvGrpSpPr>
+        <p:cNvPr id="1" name=""/>
+        <p:cNvGrpSpPr/>
+        <p:nvPr/>
+      </p:nvGrpSpPr>
+      <p:grpSpPr>
+        <a:xfrm>
+          <a:off x="0" y="0"/>
+          <a:ext cx="0" cy="0"/>
+          <a:chOff x="0" y="0"/>
+          <a:chExt cx="0" cy="0"/>
+        </a:xfrm>
+      </p:grpSpPr>
+      <p:sp>
+        <p:nvSpPr>
+          <p:cNvPr id="4" name="TextBox 3"/>
+          <p:cNvSpPr txBox="1"/>
+          <p:nvPr/>
+        </p:nvSpPr>
+        <p:spPr>
+          <a:xfrm>
+            <a:off x="606174" y="2586375"/>
+            <a:ext cx="11034445" cy="1015663"/>
+          </a:xfrm>
+          <a:prstGeom prst="rect">
+            <a:avLst/>
+          </a:prstGeom>
+          <a:noFill/>
+        </p:spPr>
+        <p:txBody>
+          <a:bodyPr wrap="square" rtlCol="0">
+            <a:spAutoFit/>
+          </a:bodyPr>
+          <a:lstStyle/>
+          <a:p>
+            <a:r>
+              <a:rPr lang="en-US" sz="6000" kern="1200" dirty="0" smtClean="0">
+                <a:solidFill>
+                  <a:srgbClr val="289FD7"/>
+                </a:solidFill>
+                <a:latin typeface="+mj-lt"/>
+                <a:ea typeface="+mj-ea"/>
+                <a:cs typeface="+mj-cs"/>
+              </a:rPr>
+              <a:t>Demo</a:t>
+            </a:r>
+            <a:endParaRPr lang="en-US" sz="6000" kern="1200" dirty="0">
+              <a:solidFill>
+                <a:srgbClr val="289FD7"/>
+              </a:solidFill>
+              <a:latin typeface="+mj-lt"/>
+              <a:ea typeface="+mj-ea"/>
+              <a:cs typeface="+mj-cs"/>
+            </a:endParaRPr>
+          </a:p>
+        </p:txBody>
+      </p:sp>
+      <p:sp>
+        <p:nvSpPr>
+          <p:cNvPr id="2" name="Title 1"/>
+          <p:cNvSpPr>
+            <a:spLocks noGrp="1"/>
+          </p:cNvSpPr>
+          <p:nvPr>
+            <p:ph type="title"/>
+          </p:nvPr>
+        </p:nvSpPr>
+        <p:spPr>
+          <a:xfrm>
+            <a:off x="606173" y="3602038"/>
+            <a:ext cx="11034445" cy="1643062"/>
+          </a:xfrm>
+        </p:spPr>
+        <p:txBody>
+          <a:bodyPr anchor="t"/>
+          <a:lstStyle>
+            <a:lvl1pPr>
+              <a:defRPr lang="en-US" sz="3600" kern="1200" smtClean="0">
+                <a:solidFill>
+                  <a:schemeClr val="bg1"/>
+                </a:solidFill>
+                <a:latin typeface="+mn-lt"/>
+                <a:ea typeface="+mn-ea"/>
+                <a:cs typeface="+mn-cs"/>
+              </a:defRPr>
+            </a:lvl1pPr>
+          </a:lstStyle>
+          <a:p>
+            <a:r>
+              <a:rPr lang="en-US" dirty="0" smtClean="0"/>
+              <a:t>Click to edit Master title style</a:t>
+            </a:r>
+            <a:endParaRPr lang="en-US" dirty="0"/>
+          </a:p>
+        </p:txBody>
+      </p:sp>
+    </p:spTree>
+    <p:extLst>
+      <p:ext uri="{BB962C8B-B14F-4D97-AF65-F5344CB8AC3E}">
+        <p14:creationId xmlns:p14="http://schemas.microsoft.com/office/powerpoint/2010/main" val="1711270620"/>
+      </p:ext>
+    </p:extLst>
+  </p:cSld>
+  <p:clrMapOvr>
+    <a:masterClrMapping/>
+  </p:clrMapOvr>
+  <p:timing>
+    <p:tnLst>
+      <p:par>
+        <p:cTn id="1" dur="indefinite" restart="never" nodeType="tmRoot"/>
+      </p:par>
+    </p:tnLst>
+  </p:timing>
+</p:sldLayout>
+</file>
+
+<file path=ppt/slideLayouts/slideLayout66.xml><?xml version="1.0" encoding="utf-8"?>
 <p:sldLayout xmlns:a="http://schemas.openxmlformats.org/drawingml/2006/main" xmlns:r="http://schemas.openxmlformats.org/officeDocument/2006/relationships" xmlns:p="http://schemas.openxmlformats.org/presentationml/2006/main" type="title" preserve="1">
   <p:cSld name="Title Slide">
     <p:bg>
@@ -14920,7 +15290,7 @@
 </p:sldLayout>
 </file>
 
-<file path=ppt/slideLayouts/slideLayout66.xml><?xml version="1.0" encoding="utf-8"?>
+<file path=ppt/slideLayouts/slideLayout67.xml><?xml version="1.0" encoding="utf-8"?>
 <p:sldLayout xmlns:a="http://schemas.openxmlformats.org/drawingml/2006/main" xmlns:r="http://schemas.openxmlformats.org/officeDocument/2006/relationships" xmlns:p="http://schemas.openxmlformats.org/presentationml/2006/main" type="obj" preserve="1">
   <p:cSld name="Title and Content">
     <p:bg>
@@ -15040,7 +15410,7 @@
 </p:sldLayout>
 </file>
 
-<file path=ppt/slideLayouts/slideLayout67.xml><?xml version="1.0" encoding="utf-8"?>
+<file path=ppt/slideLayouts/slideLayout68.xml><?xml version="1.0" encoding="utf-8"?>
 <p:sldLayout xmlns:a="http://schemas.openxmlformats.org/drawingml/2006/main" xmlns:r="http://schemas.openxmlformats.org/officeDocument/2006/relationships" xmlns:p="http://schemas.openxmlformats.org/presentationml/2006/main" preserve="1">
   <p:cSld name="1_Title and Content">
     <p:spTree>
@@ -15197,7 +15567,7 @@
 </p:sldLayout>
 </file>
 
-<file path=ppt/slideLayouts/slideLayout68.xml><?xml version="1.0" encoding="utf-8"?>
+<file path=ppt/slideLayouts/slideLayout69.xml><?xml version="1.0" encoding="utf-8"?>
 <p:sldLayout xmlns:a="http://schemas.openxmlformats.org/drawingml/2006/main" xmlns:r="http://schemas.openxmlformats.org/officeDocument/2006/relationships" xmlns:p="http://schemas.openxmlformats.org/presentationml/2006/main" type="titleOnly" preserve="1">
   <p:cSld name="Title Only">
     <p:bg>
@@ -15265,7 +15635,119 @@
 </p:sldLayout>
 </file>
 
-<file path=ppt/slideLayouts/slideLayout69.xml><?xml version="1.0" encoding="utf-8"?>
+<file path=ppt/slideLayouts/slideLayout7.xml><?xml version="1.0" encoding="utf-8"?>
+<p:sldLayout xmlns:a="http://schemas.openxmlformats.org/drawingml/2006/main" xmlns:r="http://schemas.openxmlformats.org/officeDocument/2006/relationships" xmlns:p="http://schemas.openxmlformats.org/presentationml/2006/main" type="obj" preserve="1">
+  <p:cSld name="Title and Content">
+    <p:spTree>
+      <p:nvGrpSpPr>
+        <p:cNvPr id="1" name=""/>
+        <p:cNvGrpSpPr/>
+        <p:nvPr/>
+      </p:nvGrpSpPr>
+      <p:grpSpPr>
+        <a:xfrm>
+          <a:off x="0" y="0"/>
+          <a:ext cx="0" cy="0"/>
+          <a:chOff x="0" y="0"/>
+          <a:chExt cx="0" cy="0"/>
+        </a:xfrm>
+      </p:grpSpPr>
+      <p:sp>
+        <p:nvSpPr>
+          <p:cNvPr id="2" name="Title 1"/>
+          <p:cNvSpPr>
+            <a:spLocks noGrp="1"/>
+          </p:cNvSpPr>
+          <p:nvPr>
+            <p:ph type="title"/>
+          </p:nvPr>
+        </p:nvSpPr>
+        <p:spPr/>
+        <p:txBody>
+          <a:bodyPr/>
+          <a:lstStyle/>
+          <a:p>
+            <a:r>
+              <a:rPr lang="en-US" smtClean="0"/>
+              <a:t>Click to edit Master title style</a:t>
+            </a:r>
+            <a:endParaRPr lang="en-US"/>
+          </a:p>
+        </p:txBody>
+      </p:sp>
+      <p:sp>
+        <p:nvSpPr>
+          <p:cNvPr id="3" name="Content Placeholder 2"/>
+          <p:cNvSpPr>
+            <a:spLocks noGrp="1"/>
+          </p:cNvSpPr>
+          <p:nvPr>
+            <p:ph idx="1"/>
+          </p:nvPr>
+        </p:nvSpPr>
+        <p:spPr/>
+        <p:txBody>
+          <a:bodyPr/>
+          <a:lstStyle/>
+          <a:p>
+            <a:pPr lvl="0"/>
+            <a:r>
+              <a:rPr lang="en-US" smtClean="0"/>
+              <a:t>Click to edit Master text styles</a:t>
+            </a:r>
+          </a:p>
+          <a:p>
+            <a:pPr lvl="1"/>
+            <a:r>
+              <a:rPr lang="en-US" smtClean="0"/>
+              <a:t>Second level</a:t>
+            </a:r>
+          </a:p>
+          <a:p>
+            <a:pPr lvl="2"/>
+            <a:r>
+              <a:rPr lang="en-US" smtClean="0"/>
+              <a:t>Third level</a:t>
+            </a:r>
+          </a:p>
+          <a:p>
+            <a:pPr lvl="3"/>
+            <a:r>
+              <a:rPr lang="en-US" smtClean="0"/>
+              <a:t>Fourth level</a:t>
+            </a:r>
+          </a:p>
+          <a:p>
+            <a:pPr lvl="4"/>
+            <a:r>
+              <a:rPr lang="en-US" smtClean="0"/>
+              <a:t>Fifth level</a:t>
+            </a:r>
+            <a:endParaRPr lang="en-US"/>
+          </a:p>
+        </p:txBody>
+      </p:sp>
+    </p:spTree>
+    <p:extLst>
+      <p:ext uri="{BB962C8B-B14F-4D97-AF65-F5344CB8AC3E}">
+        <p14:creationId xmlns:p14="http://schemas.microsoft.com/office/powerpoint/2010/main" val="367927830"/>
+      </p:ext>
+    </p:extLst>
+  </p:cSld>
+  <p:clrMapOvr>
+    <a:masterClrMapping/>
+  </p:clrMapOvr>
+  <p:timing>
+    <p:tnLst>
+      <p:par>
+        <p:cTn id="1" dur="indefinite" restart="never" nodeType="tmRoot"/>
+      </p:par>
+    </p:tnLst>
+  </p:timing>
+</p:sldLayout>
+</file>
+
+<file path=ppt/slideLayouts/slideLayout70.xml><?xml version="1.0" encoding="utf-8"?>
 <p:sldLayout xmlns:a="http://schemas.openxmlformats.org/drawingml/2006/main" xmlns:r="http://schemas.openxmlformats.org/officeDocument/2006/relationships" xmlns:p="http://schemas.openxmlformats.org/presentationml/2006/main" preserve="1">
   <p:cSld name="1_Title Only">
     <p:spTree>
@@ -16207,119 +16689,7 @@
 </p:sldLayout>
 </file>
 
-<file path=ppt/slideLayouts/slideLayout7.xml><?xml version="1.0" encoding="utf-8"?>
-<p:sldLayout xmlns:a="http://schemas.openxmlformats.org/drawingml/2006/main" xmlns:r="http://schemas.openxmlformats.org/officeDocument/2006/relationships" xmlns:p="http://schemas.openxmlformats.org/presentationml/2006/main" type="obj" preserve="1">
-  <p:cSld name="Title and Content">
-    <p:spTree>
-      <p:nvGrpSpPr>
-        <p:cNvPr id="1" name=""/>
-        <p:cNvGrpSpPr/>
-        <p:nvPr/>
-      </p:nvGrpSpPr>
-      <p:grpSpPr>
-        <a:xfrm>
-          <a:off x="0" y="0"/>
-          <a:ext cx="0" cy="0"/>
-          <a:chOff x="0" y="0"/>
-          <a:chExt cx="0" cy="0"/>
-        </a:xfrm>
-      </p:grpSpPr>
-      <p:sp>
-        <p:nvSpPr>
-          <p:cNvPr id="2" name="Title 1"/>
-          <p:cNvSpPr>
-            <a:spLocks noGrp="1"/>
-          </p:cNvSpPr>
-          <p:nvPr>
-            <p:ph type="title"/>
-          </p:nvPr>
-        </p:nvSpPr>
-        <p:spPr/>
-        <p:txBody>
-          <a:bodyPr/>
-          <a:lstStyle/>
-          <a:p>
-            <a:r>
-              <a:rPr lang="en-US" smtClean="0"/>
-              <a:t>Click to edit Master title style</a:t>
-            </a:r>
-            <a:endParaRPr lang="en-US"/>
-          </a:p>
-        </p:txBody>
-      </p:sp>
-      <p:sp>
-        <p:nvSpPr>
-          <p:cNvPr id="3" name="Content Placeholder 2"/>
-          <p:cNvSpPr>
-            <a:spLocks noGrp="1"/>
-          </p:cNvSpPr>
-          <p:nvPr>
-            <p:ph idx="1"/>
-          </p:nvPr>
-        </p:nvSpPr>
-        <p:spPr/>
-        <p:txBody>
-          <a:bodyPr/>
-          <a:lstStyle/>
-          <a:p>
-            <a:pPr lvl="0"/>
-            <a:r>
-              <a:rPr lang="en-US" smtClean="0"/>
-              <a:t>Click to edit Master text styles</a:t>
-            </a:r>
-          </a:p>
-          <a:p>
-            <a:pPr lvl="1"/>
-            <a:r>
-              <a:rPr lang="en-US" smtClean="0"/>
-              <a:t>Second level</a:t>
-            </a:r>
-          </a:p>
-          <a:p>
-            <a:pPr lvl="2"/>
-            <a:r>
-              <a:rPr lang="en-US" smtClean="0"/>
-              <a:t>Third level</a:t>
-            </a:r>
-          </a:p>
-          <a:p>
-            <a:pPr lvl="3"/>
-            <a:r>
-              <a:rPr lang="en-US" smtClean="0"/>
-              <a:t>Fourth level</a:t>
-            </a:r>
-          </a:p>
-          <a:p>
-            <a:pPr lvl="4"/>
-            <a:r>
-              <a:rPr lang="en-US" smtClean="0"/>
-              <a:t>Fifth level</a:t>
-            </a:r>
-            <a:endParaRPr lang="en-US"/>
-          </a:p>
-        </p:txBody>
-      </p:sp>
-    </p:spTree>
-    <p:extLst>
-      <p:ext uri="{BB962C8B-B14F-4D97-AF65-F5344CB8AC3E}">
-        <p14:creationId xmlns:p14="http://schemas.microsoft.com/office/powerpoint/2010/main" val="367927830"/>
-      </p:ext>
-    </p:extLst>
-  </p:cSld>
-  <p:clrMapOvr>
-    <a:masterClrMapping/>
-  </p:clrMapOvr>
-  <p:timing>
-    <p:tnLst>
-      <p:par>
-        <p:cTn id="1" dur="indefinite" restart="never" nodeType="tmRoot"/>
-      </p:par>
-    </p:tnLst>
-  </p:timing>
-</p:sldLayout>
-</file>
-
-<file path=ppt/slideLayouts/slideLayout70.xml><?xml version="1.0" encoding="utf-8"?>
+<file path=ppt/slideLayouts/slideLayout71.xml><?xml version="1.0" encoding="utf-8"?>
 <p:sldLayout xmlns:a="http://schemas.openxmlformats.org/drawingml/2006/main" xmlns:r="http://schemas.openxmlformats.org/officeDocument/2006/relationships" xmlns:p="http://schemas.openxmlformats.org/presentationml/2006/main" type="blank" preserve="1">
   <p:cSld name="1_Blank">
     <p:bg>
@@ -16364,7 +16734,7 @@
 </p:sldLayout>
 </file>
 
-<file path=ppt/slideLayouts/slideLayout71.xml><?xml version="1.0" encoding="utf-8"?>
+<file path=ppt/slideLayouts/slideLayout72.xml><?xml version="1.0" encoding="utf-8"?>
 <p:sldLayout xmlns:a="http://schemas.openxmlformats.org/drawingml/2006/main" xmlns:r="http://schemas.openxmlformats.org/officeDocument/2006/relationships" xmlns:p="http://schemas.openxmlformats.org/presentationml/2006/main" type="objTx" preserve="1">
   <p:cSld name="Content with Caption">
     <p:bg>
@@ -16605,7 +16975,7 @@
 </p:sldLayout>
 </file>
 
-<file path=ppt/slideLayouts/slideLayout72.xml><?xml version="1.0" encoding="utf-8"?>
+<file path=ppt/slideLayouts/slideLayout73.xml><?xml version="1.0" encoding="utf-8"?>
 <p:sldLayout xmlns:a="http://schemas.openxmlformats.org/drawingml/2006/main" xmlns:r="http://schemas.openxmlformats.org/officeDocument/2006/relationships" xmlns:p="http://schemas.openxmlformats.org/presentationml/2006/main" type="title" preserve="1">
   <p:cSld name="Title Slide">
     <p:bg>
@@ -16749,7 +17119,7 @@
 </p:sldLayout>
 </file>
 
-<file path=ppt/slideLayouts/slideLayout73.xml><?xml version="1.0" encoding="utf-8"?>
+<file path=ppt/slideLayouts/slideLayout74.xml><?xml version="1.0" encoding="utf-8"?>
 <p:sldLayout xmlns:a="http://schemas.openxmlformats.org/drawingml/2006/main" xmlns:r="http://schemas.openxmlformats.org/officeDocument/2006/relationships" xmlns:p="http://schemas.openxmlformats.org/presentationml/2006/main" type="obj" preserve="1">
   <p:cSld name="Title and Content">
     <p:bg>
@@ -16869,7 +17239,7 @@
 </p:sldLayout>
 </file>
 
-<file path=ppt/slideLayouts/slideLayout74.xml><?xml version="1.0" encoding="utf-8"?>
+<file path=ppt/slideLayouts/slideLayout75.xml><?xml version="1.0" encoding="utf-8"?>
 <p:sldLayout xmlns:a="http://schemas.openxmlformats.org/drawingml/2006/main" xmlns:r="http://schemas.openxmlformats.org/officeDocument/2006/relationships" xmlns:p="http://schemas.openxmlformats.org/presentationml/2006/main" preserve="1">
   <p:cSld name="1_Title and Content">
     <p:spTree>
@@ -17026,7 +17396,7 @@
 </p:sldLayout>
 </file>
 
-<file path=ppt/slideLayouts/slideLayout75.xml><?xml version="1.0" encoding="utf-8"?>
+<file path=ppt/slideLayouts/slideLayout76.xml><?xml version="1.0" encoding="utf-8"?>
 <p:sldLayout xmlns:a="http://schemas.openxmlformats.org/drawingml/2006/main" xmlns:r="http://schemas.openxmlformats.org/officeDocument/2006/relationships" xmlns:p="http://schemas.openxmlformats.org/presentationml/2006/main" type="titleOnly" preserve="1">
   <p:cSld name="Title Only">
     <p:bg>
@@ -17094,7 +17464,7 @@
 </p:sldLayout>
 </file>
 
-<file path=ppt/slideLayouts/slideLayout76.xml><?xml version="1.0" encoding="utf-8"?>
+<file path=ppt/slideLayouts/slideLayout77.xml><?xml version="1.0" encoding="utf-8"?>
 <p:sldLayout xmlns:a="http://schemas.openxmlformats.org/drawingml/2006/main" xmlns:r="http://schemas.openxmlformats.org/officeDocument/2006/relationships" xmlns:p="http://schemas.openxmlformats.org/presentationml/2006/main" preserve="1">
   <p:cSld name="1_Title Only">
     <p:spTree>
@@ -18092,7 +18462,7 @@
 </p:sldLayout>
 </file>
 
-<file path=ppt/slideLayouts/slideLayout77.xml><?xml version="1.0" encoding="utf-8"?>
+<file path=ppt/slideLayouts/slideLayout78.xml><?xml version="1.0" encoding="utf-8"?>
 <p:sldLayout xmlns:a="http://schemas.openxmlformats.org/drawingml/2006/main" xmlns:r="http://schemas.openxmlformats.org/officeDocument/2006/relationships" xmlns:p="http://schemas.openxmlformats.org/presentationml/2006/main" type="blank" preserve="1">
   <p:cSld name="1_Blank">
     <p:bg>
@@ -18137,7 +18507,7 @@
 </p:sldLayout>
 </file>
 
-<file path=ppt/slideLayouts/slideLayout78.xml><?xml version="1.0" encoding="utf-8"?>
+<file path=ppt/slideLayouts/slideLayout79.xml><?xml version="1.0" encoding="utf-8"?>
 <p:sldLayout xmlns:a="http://schemas.openxmlformats.org/drawingml/2006/main" xmlns:r="http://schemas.openxmlformats.org/officeDocument/2006/relationships" xmlns:p="http://schemas.openxmlformats.org/presentationml/2006/main" type="objTx" preserve="1">
   <p:cSld name="Content with Caption">
     <p:bg>
@@ -18378,7 +18748,164 @@
 </p:sldLayout>
 </file>
 
-<file path=ppt/slideLayouts/slideLayout79.xml><?xml version="1.0" encoding="utf-8"?>
+<file path=ppt/slideLayouts/slideLayout8.xml><?xml version="1.0" encoding="utf-8"?>
+<p:sldLayout xmlns:a="http://schemas.openxmlformats.org/drawingml/2006/main" xmlns:r="http://schemas.openxmlformats.org/officeDocument/2006/relationships" xmlns:p="http://schemas.openxmlformats.org/presentationml/2006/main" preserve="1">
+  <p:cSld name="1_Title and Content">
+    <p:spTree>
+      <p:nvGrpSpPr>
+        <p:cNvPr id="1" name=""/>
+        <p:cNvGrpSpPr/>
+        <p:nvPr/>
+      </p:nvGrpSpPr>
+      <p:grpSpPr>
+        <a:xfrm>
+          <a:off x="0" y="0"/>
+          <a:ext cx="0" cy="0"/>
+          <a:chOff x="0" y="0"/>
+          <a:chExt cx="0" cy="0"/>
+        </a:xfrm>
+      </p:grpSpPr>
+      <p:sp>
+        <p:nvSpPr>
+          <p:cNvPr id="2" name="Title 1"/>
+          <p:cNvSpPr>
+            <a:spLocks noGrp="1"/>
+          </p:cNvSpPr>
+          <p:nvPr>
+            <p:ph type="title"/>
+          </p:nvPr>
+        </p:nvSpPr>
+        <p:spPr/>
+        <p:txBody>
+          <a:bodyPr/>
+          <a:lstStyle/>
+          <a:p>
+            <a:r>
+              <a:rPr lang="en-US" smtClean="0"/>
+              <a:t>Click to edit Master title style</a:t>
+            </a:r>
+            <a:endParaRPr lang="en-US"/>
+          </a:p>
+        </p:txBody>
+      </p:sp>
+      <p:sp>
+        <p:nvSpPr>
+          <p:cNvPr id="3" name="Content Placeholder 2"/>
+          <p:cNvSpPr>
+            <a:spLocks noGrp="1"/>
+          </p:cNvSpPr>
+          <p:nvPr>
+            <p:ph idx="1"/>
+          </p:nvPr>
+        </p:nvSpPr>
+        <p:spPr>
+          <a:xfrm>
+            <a:off x="560798" y="2111604"/>
+            <a:ext cx="11079822" cy="3980971"/>
+          </a:xfrm>
+        </p:spPr>
+        <p:txBody>
+          <a:bodyPr/>
+          <a:lstStyle/>
+          <a:p>
+            <a:pPr lvl="0"/>
+            <a:r>
+              <a:rPr lang="en-US" smtClean="0"/>
+              <a:t>Click to edit Master text styles</a:t>
+            </a:r>
+          </a:p>
+          <a:p>
+            <a:pPr lvl="1"/>
+            <a:r>
+              <a:rPr lang="en-US" smtClean="0"/>
+              <a:t>Second level</a:t>
+            </a:r>
+          </a:p>
+          <a:p>
+            <a:pPr lvl="2"/>
+            <a:r>
+              <a:rPr lang="en-US" smtClean="0"/>
+              <a:t>Third level</a:t>
+            </a:r>
+          </a:p>
+          <a:p>
+            <a:pPr lvl="3"/>
+            <a:r>
+              <a:rPr lang="en-US" smtClean="0"/>
+              <a:t>Fourth level</a:t>
+            </a:r>
+          </a:p>
+          <a:p>
+            <a:pPr lvl="4"/>
+            <a:r>
+              <a:rPr lang="en-US" smtClean="0"/>
+              <a:t>Fifth level</a:t>
+            </a:r>
+            <a:endParaRPr lang="en-US"/>
+          </a:p>
+        </p:txBody>
+      </p:sp>
+      <p:sp>
+        <p:nvSpPr>
+          <p:cNvPr id="5" name="Text Placeholder 4"/>
+          <p:cNvSpPr>
+            <a:spLocks noGrp="1"/>
+          </p:cNvSpPr>
+          <p:nvPr>
+            <p:ph type="body" sz="quarter" idx="13" hasCustomPrompt="1"/>
+          </p:nvPr>
+        </p:nvSpPr>
+        <p:spPr>
+          <a:xfrm>
+            <a:off x="560388" y="1534096"/>
+            <a:ext cx="11080750" cy="437594"/>
+          </a:xfrm>
+        </p:spPr>
+        <p:txBody>
+          <a:bodyPr>
+            <a:normAutofit/>
+          </a:bodyPr>
+          <a:lstStyle>
+            <a:lvl1pPr marL="0" indent="0">
+              <a:buFontTx/>
+              <a:buNone/>
+              <a:defRPr sz="2000" cap="all" baseline="0"/>
+            </a:lvl1pPr>
+            <a:lvl5pPr>
+              <a:defRPr/>
+            </a:lvl5pPr>
+          </a:lstStyle>
+          <a:p>
+            <a:pPr lvl="0"/>
+            <a:r>
+              <a:rPr lang="en-US" dirty="0" smtClean="0"/>
+              <a:t>Secondary refining headline</a:t>
+            </a:r>
+            <a:endParaRPr lang="en-US" dirty="0"/>
+          </a:p>
+        </p:txBody>
+      </p:sp>
+    </p:spTree>
+    <p:extLst>
+      <p:ext uri="{BB962C8B-B14F-4D97-AF65-F5344CB8AC3E}">
+        <p14:creationId xmlns:p14="http://schemas.microsoft.com/office/powerpoint/2010/main" val="1958454734"/>
+      </p:ext>
+    </p:extLst>
+  </p:cSld>
+  <p:clrMapOvr>
+    <a:masterClrMapping/>
+  </p:clrMapOvr>
+  <p:timing>
+    <p:tnLst>
+      <p:par>
+        <p:cTn id="1" dur="indefinite" restart="never" nodeType="tmRoot"/>
+      </p:par>
+    </p:tnLst>
+  </p:timing>
+</p:sldLayout>
+</file>
+
+<file path=ppt/slideLayouts/slideLayout80.xml><?xml version="1.0" encoding="utf-8"?>
 <p:sldLayout xmlns:a="http://schemas.openxmlformats.org/drawingml/2006/main" xmlns:r="http://schemas.openxmlformats.org/officeDocument/2006/relationships" xmlns:p="http://schemas.openxmlformats.org/presentationml/2006/main" type="title" preserve="1">
   <p:cSld name="Title Slide">
     <p:bg>
@@ -18522,164 +19049,7 @@
 </p:sldLayout>
 </file>
 
-<file path=ppt/slideLayouts/slideLayout8.xml><?xml version="1.0" encoding="utf-8"?>
-<p:sldLayout xmlns:a="http://schemas.openxmlformats.org/drawingml/2006/main" xmlns:r="http://schemas.openxmlformats.org/officeDocument/2006/relationships" xmlns:p="http://schemas.openxmlformats.org/presentationml/2006/main" preserve="1">
-  <p:cSld name="1_Title and Content">
-    <p:spTree>
-      <p:nvGrpSpPr>
-        <p:cNvPr id="1" name=""/>
-        <p:cNvGrpSpPr/>
-        <p:nvPr/>
-      </p:nvGrpSpPr>
-      <p:grpSpPr>
-        <a:xfrm>
-          <a:off x="0" y="0"/>
-          <a:ext cx="0" cy="0"/>
-          <a:chOff x="0" y="0"/>
-          <a:chExt cx="0" cy="0"/>
-        </a:xfrm>
-      </p:grpSpPr>
-      <p:sp>
-        <p:nvSpPr>
-          <p:cNvPr id="2" name="Title 1"/>
-          <p:cNvSpPr>
-            <a:spLocks noGrp="1"/>
-          </p:cNvSpPr>
-          <p:nvPr>
-            <p:ph type="title"/>
-          </p:nvPr>
-        </p:nvSpPr>
-        <p:spPr/>
-        <p:txBody>
-          <a:bodyPr/>
-          <a:lstStyle/>
-          <a:p>
-            <a:r>
-              <a:rPr lang="en-US" smtClean="0"/>
-              <a:t>Click to edit Master title style</a:t>
-            </a:r>
-            <a:endParaRPr lang="en-US"/>
-          </a:p>
-        </p:txBody>
-      </p:sp>
-      <p:sp>
-        <p:nvSpPr>
-          <p:cNvPr id="3" name="Content Placeholder 2"/>
-          <p:cNvSpPr>
-            <a:spLocks noGrp="1"/>
-          </p:cNvSpPr>
-          <p:nvPr>
-            <p:ph idx="1"/>
-          </p:nvPr>
-        </p:nvSpPr>
-        <p:spPr>
-          <a:xfrm>
-            <a:off x="560798" y="2111604"/>
-            <a:ext cx="11079822" cy="3980971"/>
-          </a:xfrm>
-        </p:spPr>
-        <p:txBody>
-          <a:bodyPr/>
-          <a:lstStyle/>
-          <a:p>
-            <a:pPr lvl="0"/>
-            <a:r>
-              <a:rPr lang="en-US" smtClean="0"/>
-              <a:t>Click to edit Master text styles</a:t>
-            </a:r>
-          </a:p>
-          <a:p>
-            <a:pPr lvl="1"/>
-            <a:r>
-              <a:rPr lang="en-US" smtClean="0"/>
-              <a:t>Second level</a:t>
-            </a:r>
-          </a:p>
-          <a:p>
-            <a:pPr lvl="2"/>
-            <a:r>
-              <a:rPr lang="en-US" smtClean="0"/>
-              <a:t>Third level</a:t>
-            </a:r>
-          </a:p>
-          <a:p>
-            <a:pPr lvl="3"/>
-            <a:r>
-              <a:rPr lang="en-US" smtClean="0"/>
-              <a:t>Fourth level</a:t>
-            </a:r>
-          </a:p>
-          <a:p>
-            <a:pPr lvl="4"/>
-            <a:r>
-              <a:rPr lang="en-US" smtClean="0"/>
-              <a:t>Fifth level</a:t>
-            </a:r>
-            <a:endParaRPr lang="en-US"/>
-          </a:p>
-        </p:txBody>
-      </p:sp>
-      <p:sp>
-        <p:nvSpPr>
-          <p:cNvPr id="5" name="Text Placeholder 4"/>
-          <p:cNvSpPr>
-            <a:spLocks noGrp="1"/>
-          </p:cNvSpPr>
-          <p:nvPr>
-            <p:ph type="body" sz="quarter" idx="13" hasCustomPrompt="1"/>
-          </p:nvPr>
-        </p:nvSpPr>
-        <p:spPr>
-          <a:xfrm>
-            <a:off x="560388" y="1534096"/>
-            <a:ext cx="11080750" cy="437594"/>
-          </a:xfrm>
-        </p:spPr>
-        <p:txBody>
-          <a:bodyPr>
-            <a:normAutofit/>
-          </a:bodyPr>
-          <a:lstStyle>
-            <a:lvl1pPr marL="0" indent="0">
-              <a:buFontTx/>
-              <a:buNone/>
-              <a:defRPr sz="2000" cap="all" baseline="0"/>
-            </a:lvl1pPr>
-            <a:lvl5pPr>
-              <a:defRPr/>
-            </a:lvl5pPr>
-          </a:lstStyle>
-          <a:p>
-            <a:pPr lvl="0"/>
-            <a:r>
-              <a:rPr lang="en-US" dirty="0" smtClean="0"/>
-              <a:t>Secondary refining headline</a:t>
-            </a:r>
-            <a:endParaRPr lang="en-US" dirty="0"/>
-          </a:p>
-        </p:txBody>
-      </p:sp>
-    </p:spTree>
-    <p:extLst>
-      <p:ext uri="{BB962C8B-B14F-4D97-AF65-F5344CB8AC3E}">
-        <p14:creationId xmlns:p14="http://schemas.microsoft.com/office/powerpoint/2010/main" val="1958454734"/>
-      </p:ext>
-    </p:extLst>
-  </p:cSld>
-  <p:clrMapOvr>
-    <a:masterClrMapping/>
-  </p:clrMapOvr>
-  <p:timing>
-    <p:tnLst>
-      <p:par>
-        <p:cTn id="1" dur="indefinite" restart="never" nodeType="tmRoot"/>
-      </p:par>
-    </p:tnLst>
-  </p:timing>
-</p:sldLayout>
-</file>
-
-<file path=ppt/slideLayouts/slideLayout80.xml><?xml version="1.0" encoding="utf-8"?>
+<file path=ppt/slideLayouts/slideLayout81.xml><?xml version="1.0" encoding="utf-8"?>
 <p:sldLayout xmlns:a="http://schemas.openxmlformats.org/drawingml/2006/main" xmlns:r="http://schemas.openxmlformats.org/officeDocument/2006/relationships" xmlns:p="http://schemas.openxmlformats.org/presentationml/2006/main" type="obj" preserve="1">
   <p:cSld name="Title and Content">
     <p:bg>
@@ -18799,7 +19169,7 @@
 </p:sldLayout>
 </file>
 
-<file path=ppt/slideLayouts/slideLayout81.xml><?xml version="1.0" encoding="utf-8"?>
+<file path=ppt/slideLayouts/slideLayout82.xml><?xml version="1.0" encoding="utf-8"?>
 <p:sldLayout xmlns:a="http://schemas.openxmlformats.org/drawingml/2006/main" xmlns:r="http://schemas.openxmlformats.org/officeDocument/2006/relationships" xmlns:p="http://schemas.openxmlformats.org/presentationml/2006/main" preserve="1">
   <p:cSld name="1_Title and Content">
     <p:spTree>
@@ -18956,7 +19326,7 @@
 </p:sldLayout>
 </file>
 
-<file path=ppt/slideLayouts/slideLayout82.xml><?xml version="1.0" encoding="utf-8"?>
+<file path=ppt/slideLayouts/slideLayout83.xml><?xml version="1.0" encoding="utf-8"?>
 <p:sldLayout xmlns:a="http://schemas.openxmlformats.org/drawingml/2006/main" xmlns:r="http://schemas.openxmlformats.org/officeDocument/2006/relationships" xmlns:p="http://schemas.openxmlformats.org/presentationml/2006/main" type="titleOnly" preserve="1">
   <p:cSld name="Title Only">
     <p:bg>
@@ -19024,7 +19394,7 @@
 </p:sldLayout>
 </file>
 
-<file path=ppt/slideLayouts/slideLayout83.xml><?xml version="1.0" encoding="utf-8"?>
+<file path=ppt/slideLayouts/slideLayout84.xml><?xml version="1.0" encoding="utf-8"?>
 <p:sldLayout xmlns:a="http://schemas.openxmlformats.org/drawingml/2006/main" xmlns:r="http://schemas.openxmlformats.org/officeDocument/2006/relationships" xmlns:p="http://schemas.openxmlformats.org/presentationml/2006/main" preserve="1">
   <p:cSld name="1_Title Only">
     <p:spTree>
@@ -20028,7 +20398,7 @@
 </p:sldLayout>
 </file>
 
-<file path=ppt/slideLayouts/slideLayout84.xml><?xml version="1.0" encoding="utf-8"?>
+<file path=ppt/slideLayouts/slideLayout85.xml><?xml version="1.0" encoding="utf-8"?>
 <p:sldLayout xmlns:a="http://schemas.openxmlformats.org/drawingml/2006/main" xmlns:r="http://schemas.openxmlformats.org/officeDocument/2006/relationships" xmlns:p="http://schemas.openxmlformats.org/presentationml/2006/main" type="blank" preserve="1">
   <p:cSld name="1_Blank">
     <p:bg>
@@ -20073,7 +20443,7 @@
 </p:sldLayout>
 </file>
 
-<file path=ppt/slideLayouts/slideLayout85.xml><?xml version="1.0" encoding="utf-8"?>
+<file path=ppt/slideLayouts/slideLayout86.xml><?xml version="1.0" encoding="utf-8"?>
 <p:sldLayout xmlns:a="http://schemas.openxmlformats.org/drawingml/2006/main" xmlns:r="http://schemas.openxmlformats.org/officeDocument/2006/relationships" xmlns:p="http://schemas.openxmlformats.org/presentationml/2006/main" type="objTx" preserve="1">
   <p:cSld name="Content with Caption">
     <p:bg>
@@ -20314,7 +20684,7 @@
 </p:sldLayout>
 </file>
 
-<file path=ppt/slideLayouts/slideLayout86.xml><?xml version="1.0" encoding="utf-8"?>
+<file path=ppt/slideLayouts/slideLayout87.xml><?xml version="1.0" encoding="utf-8"?>
 <p:sldLayout xmlns:a="http://schemas.openxmlformats.org/drawingml/2006/main" xmlns:r="http://schemas.openxmlformats.org/officeDocument/2006/relationships" xmlns:p="http://schemas.openxmlformats.org/presentationml/2006/main" type="title" preserve="1">
   <p:cSld name="Title Slide">
     <p:bg>
@@ -20458,7 +20828,7 @@
 </p:sldLayout>
 </file>
 
-<file path=ppt/slideLayouts/slideLayout87.xml><?xml version="1.0" encoding="utf-8"?>
+<file path=ppt/slideLayouts/slideLayout88.xml><?xml version="1.0" encoding="utf-8"?>
 <p:sldLayout xmlns:a="http://schemas.openxmlformats.org/drawingml/2006/main" xmlns:r="http://schemas.openxmlformats.org/officeDocument/2006/relationships" xmlns:p="http://schemas.openxmlformats.org/presentationml/2006/main" type="obj" preserve="1">
   <p:cSld name="Title and Content">
     <p:bg>
@@ -20578,7 +20948,7 @@
 </p:sldLayout>
 </file>
 
-<file path=ppt/slideLayouts/slideLayout88.xml><?xml version="1.0" encoding="utf-8"?>
+<file path=ppt/slideLayouts/slideLayout89.xml><?xml version="1.0" encoding="utf-8"?>
 <p:sldLayout xmlns:a="http://schemas.openxmlformats.org/drawingml/2006/main" xmlns:r="http://schemas.openxmlformats.org/officeDocument/2006/relationships" xmlns:p="http://schemas.openxmlformats.org/presentationml/2006/main" preserve="1">
   <p:cSld name="1_Title and Content">
     <p:spTree>
@@ -20719,74 +21089,6 @@
     <p:extLst>
       <p:ext uri="{BB962C8B-B14F-4D97-AF65-F5344CB8AC3E}">
         <p14:creationId xmlns:p14="http://schemas.microsoft.com/office/powerpoint/2010/main" val="3993138325"/>
-      </p:ext>
-    </p:extLst>
-  </p:cSld>
-  <p:clrMapOvr>
-    <a:masterClrMapping/>
-  </p:clrMapOvr>
-  <p:timing>
-    <p:tnLst>
-      <p:par>
-        <p:cTn id="1" dur="indefinite" restart="never" nodeType="tmRoot"/>
-      </p:par>
-    </p:tnLst>
-  </p:timing>
-</p:sldLayout>
-</file>
-
-<file path=ppt/slideLayouts/slideLayout89.xml><?xml version="1.0" encoding="utf-8"?>
-<p:sldLayout xmlns:a="http://schemas.openxmlformats.org/drawingml/2006/main" xmlns:r="http://schemas.openxmlformats.org/officeDocument/2006/relationships" xmlns:p="http://schemas.openxmlformats.org/presentationml/2006/main" type="titleOnly" preserve="1">
-  <p:cSld name="Title Only">
-    <p:bg>
-      <p:bgPr>
-        <a:solidFill>
-          <a:schemeClr val="bg1"/>
-        </a:solidFill>
-        <a:effectLst/>
-      </p:bgPr>
-    </p:bg>
-    <p:spTree>
-      <p:nvGrpSpPr>
-        <p:cNvPr id="1" name=""/>
-        <p:cNvGrpSpPr/>
-        <p:nvPr/>
-      </p:nvGrpSpPr>
-      <p:grpSpPr>
-        <a:xfrm>
-          <a:off x="0" y="0"/>
-          <a:ext cx="0" cy="0"/>
-          <a:chOff x="0" y="0"/>
-          <a:chExt cx="0" cy="0"/>
-        </a:xfrm>
-      </p:grpSpPr>
-      <p:sp>
-        <p:nvSpPr>
-          <p:cNvPr id="2" name="Title 1"/>
-          <p:cNvSpPr>
-            <a:spLocks noGrp="1"/>
-          </p:cNvSpPr>
-          <p:nvPr>
-            <p:ph type="title"/>
-          </p:nvPr>
-        </p:nvSpPr>
-        <p:spPr/>
-        <p:txBody>
-          <a:bodyPr/>
-          <a:lstStyle/>
-          <a:p>
-            <a:r>
-              <a:rPr lang="en-US" smtClean="0"/>
-              <a:t>Click to edit Master title style</a:t>
-            </a:r>
-            <a:endParaRPr lang="en-US"/>
-          </a:p>
-        </p:txBody>
-      </p:sp>
-    </p:spTree>
-    <p:extLst>
-      <p:ext uri="{BB962C8B-B14F-4D97-AF65-F5344CB8AC3E}">
-        <p14:creationId xmlns:p14="http://schemas.microsoft.com/office/powerpoint/2010/main" val="674644901"/>
       </p:ext>
     </p:extLst>
   </p:cSld>
@@ -20864,6 +21166,74 @@
 </file>
 
 <file path=ppt/slideLayouts/slideLayout90.xml><?xml version="1.0" encoding="utf-8"?>
+<p:sldLayout xmlns:a="http://schemas.openxmlformats.org/drawingml/2006/main" xmlns:r="http://schemas.openxmlformats.org/officeDocument/2006/relationships" xmlns:p="http://schemas.openxmlformats.org/presentationml/2006/main" type="titleOnly" preserve="1">
+  <p:cSld name="Title Only">
+    <p:bg>
+      <p:bgPr>
+        <a:solidFill>
+          <a:schemeClr val="bg1"/>
+        </a:solidFill>
+        <a:effectLst/>
+      </p:bgPr>
+    </p:bg>
+    <p:spTree>
+      <p:nvGrpSpPr>
+        <p:cNvPr id="1" name=""/>
+        <p:cNvGrpSpPr/>
+        <p:nvPr/>
+      </p:nvGrpSpPr>
+      <p:grpSpPr>
+        <a:xfrm>
+          <a:off x="0" y="0"/>
+          <a:ext cx="0" cy="0"/>
+          <a:chOff x="0" y="0"/>
+          <a:chExt cx="0" cy="0"/>
+        </a:xfrm>
+      </p:grpSpPr>
+      <p:sp>
+        <p:nvSpPr>
+          <p:cNvPr id="2" name="Title 1"/>
+          <p:cNvSpPr>
+            <a:spLocks noGrp="1"/>
+          </p:cNvSpPr>
+          <p:nvPr>
+            <p:ph type="title"/>
+          </p:nvPr>
+        </p:nvSpPr>
+        <p:spPr/>
+        <p:txBody>
+          <a:bodyPr/>
+          <a:lstStyle/>
+          <a:p>
+            <a:r>
+              <a:rPr lang="en-US" smtClean="0"/>
+              <a:t>Click to edit Master title style</a:t>
+            </a:r>
+            <a:endParaRPr lang="en-US"/>
+          </a:p>
+        </p:txBody>
+      </p:sp>
+    </p:spTree>
+    <p:extLst>
+      <p:ext uri="{BB962C8B-B14F-4D97-AF65-F5344CB8AC3E}">
+        <p14:creationId xmlns:p14="http://schemas.microsoft.com/office/powerpoint/2010/main" val="674644901"/>
+      </p:ext>
+    </p:extLst>
+  </p:cSld>
+  <p:clrMapOvr>
+    <a:masterClrMapping/>
+  </p:clrMapOvr>
+  <p:timing>
+    <p:tnLst>
+      <p:par>
+        <p:cTn id="1" dur="indefinite" restart="never" nodeType="tmRoot"/>
+      </p:par>
+    </p:tnLst>
+  </p:timing>
+</p:sldLayout>
+</file>
+
+<file path=ppt/slideLayouts/slideLayout91.xml><?xml version="1.0" encoding="utf-8"?>
 <p:sldLayout xmlns:a="http://schemas.openxmlformats.org/drawingml/2006/main" xmlns:r="http://schemas.openxmlformats.org/officeDocument/2006/relationships" xmlns:p="http://schemas.openxmlformats.org/presentationml/2006/main" preserve="1">
   <p:cSld name="1_Title Only">
     <p:spTree>
@@ -21867,7 +22237,7 @@
 </p:sldLayout>
 </file>
 
-<file path=ppt/slideLayouts/slideLayout91.xml><?xml version="1.0" encoding="utf-8"?>
+<file path=ppt/slideLayouts/slideLayout92.xml><?xml version="1.0" encoding="utf-8"?>
 <p:sldLayout xmlns:a="http://schemas.openxmlformats.org/drawingml/2006/main" xmlns:r="http://schemas.openxmlformats.org/officeDocument/2006/relationships" xmlns:p="http://schemas.openxmlformats.org/presentationml/2006/main" type="blank" preserve="1">
   <p:cSld name="Blank">
     <p:bg>
@@ -21912,7 +22282,7 @@
 </p:sldLayout>
 </file>
 
-<file path=ppt/slideLayouts/slideLayout92.xml><?xml version="1.0" encoding="utf-8"?>
+<file path=ppt/slideLayouts/slideLayout93.xml><?xml version="1.0" encoding="utf-8"?>
 <p:sldLayout xmlns:a="http://schemas.openxmlformats.org/drawingml/2006/main" xmlns:r="http://schemas.openxmlformats.org/officeDocument/2006/relationships" xmlns:p="http://schemas.openxmlformats.org/presentationml/2006/main" type="objTx" preserve="1">
   <p:cSld name="Content with Caption">
     <p:bg>
@@ -22153,7 +22523,7 @@
 </p:sldLayout>
 </file>
 
-<file path=ppt/slideLayouts/slideLayout93.xml><?xml version="1.0" encoding="utf-8"?>
+<file path=ppt/slideLayouts/slideLayout94.xml><?xml version="1.0" encoding="utf-8"?>
 <p:sldLayout xmlns:a="http://schemas.openxmlformats.org/drawingml/2006/main" xmlns:r="http://schemas.openxmlformats.org/officeDocument/2006/relationships" xmlns:p="http://schemas.openxmlformats.org/presentationml/2006/main" type="title" preserve="1">
   <p:cSld name="Title Slide">
     <p:bg>
@@ -22297,7 +22667,7 @@
 </p:sldLayout>
 </file>
 
-<file path=ppt/slideLayouts/slideLayout94.xml><?xml version="1.0" encoding="utf-8"?>
+<file path=ppt/slideLayouts/slideLayout95.xml><?xml version="1.0" encoding="utf-8"?>
 <p:sldLayout xmlns:a="http://schemas.openxmlformats.org/drawingml/2006/main" xmlns:r="http://schemas.openxmlformats.org/officeDocument/2006/relationships" xmlns:p="http://schemas.openxmlformats.org/presentationml/2006/main" type="obj" preserve="1">
   <p:cSld name="Title and Content">
     <p:bg>
@@ -22417,7 +22787,7 @@
 </p:sldLayout>
 </file>
 
-<file path=ppt/slideLayouts/slideLayout95.xml><?xml version="1.0" encoding="utf-8"?>
+<file path=ppt/slideLayouts/slideLayout96.xml><?xml version="1.0" encoding="utf-8"?>
 <p:sldLayout xmlns:a="http://schemas.openxmlformats.org/drawingml/2006/main" xmlns:r="http://schemas.openxmlformats.org/officeDocument/2006/relationships" xmlns:p="http://schemas.openxmlformats.org/presentationml/2006/main" preserve="1">
   <p:cSld name="1_Title and Content">
     <p:spTree>
@@ -22605,7 +22975,7 @@
 </p:sldLayout>
 </file>
 
-<file path=ppt/slideLayouts/slideLayout96.xml><?xml version="1.0" encoding="utf-8"?>
+<file path=ppt/slideLayouts/slideLayout97.xml><?xml version="1.0" encoding="utf-8"?>
 <p:sldLayout xmlns:a="http://schemas.openxmlformats.org/drawingml/2006/main" xmlns:r="http://schemas.openxmlformats.org/officeDocument/2006/relationships" xmlns:p="http://schemas.openxmlformats.org/presentationml/2006/main" type="titleOnly" preserve="1">
   <p:cSld name="Title Only">
     <p:bg>
@@ -22673,7 +23043,7 @@
 </p:sldLayout>
 </file>
 
-<file path=ppt/slideLayouts/slideLayout97.xml><?xml version="1.0" encoding="utf-8"?>
+<file path=ppt/slideLayouts/slideLayout98.xml><?xml version="1.0" encoding="utf-8"?>
 <p:sldLayout xmlns:a="http://schemas.openxmlformats.org/drawingml/2006/main" xmlns:r="http://schemas.openxmlformats.org/officeDocument/2006/relationships" xmlns:p="http://schemas.openxmlformats.org/presentationml/2006/main" type="blank" preserve="1">
   <p:cSld name="Blank">
     <p:bg>
@@ -22718,7 +23088,7 @@
 </p:sldLayout>
 </file>
 
-<file path=ppt/slideLayouts/slideLayout98.xml><?xml version="1.0" encoding="utf-8"?>
+<file path=ppt/slideLayouts/slideLayout99.xml><?xml version="1.0" encoding="utf-8"?>
 <p:sldLayout xmlns:a="http://schemas.openxmlformats.org/drawingml/2006/main" xmlns:r="http://schemas.openxmlformats.org/officeDocument/2006/relationships" xmlns:p="http://schemas.openxmlformats.org/presentationml/2006/main" type="blank" preserve="1">
   <p:cSld name="1_Blank">
     <p:bg>
@@ -22747,247 +23117,6 @@
     <p:extLst>
       <p:ext uri="{BB962C8B-B14F-4D97-AF65-F5344CB8AC3E}">
         <p14:creationId xmlns:p14="http://schemas.microsoft.com/office/powerpoint/2010/main" val="112153625"/>
-      </p:ext>
-    </p:extLst>
-  </p:cSld>
-  <p:clrMapOvr>
-    <a:masterClrMapping/>
-  </p:clrMapOvr>
-  <p:timing>
-    <p:tnLst>
-      <p:par>
-        <p:cTn id="1" dur="indefinite" restart="never" nodeType="tmRoot"/>
-      </p:par>
-    </p:tnLst>
-  </p:timing>
-</p:sldLayout>
-</file>
-
-<file path=ppt/slideLayouts/slideLayout99.xml><?xml version="1.0" encoding="utf-8"?>
-<p:sldLayout xmlns:a="http://schemas.openxmlformats.org/drawingml/2006/main" xmlns:r="http://schemas.openxmlformats.org/officeDocument/2006/relationships" xmlns:p="http://schemas.openxmlformats.org/presentationml/2006/main" type="objTx" preserve="1">
-  <p:cSld name="Content with Caption">
-    <p:bg>
-      <p:bgPr>
-        <a:solidFill>
-          <a:schemeClr val="tx1"/>
-        </a:solidFill>
-        <a:effectLst/>
-      </p:bgPr>
-    </p:bg>
-    <p:spTree>
-      <p:nvGrpSpPr>
-        <p:cNvPr id="1" name=""/>
-        <p:cNvGrpSpPr/>
-        <p:nvPr/>
-      </p:nvGrpSpPr>
-      <p:grpSpPr>
-        <a:xfrm>
-          <a:off x="0" y="0"/>
-          <a:ext cx="0" cy="0"/>
-          <a:chOff x="0" y="0"/>
-          <a:chExt cx="0" cy="0"/>
-        </a:xfrm>
-      </p:grpSpPr>
-      <p:sp>
-        <p:nvSpPr>
-          <p:cNvPr id="2" name="Title 1"/>
-          <p:cNvSpPr>
-            <a:spLocks noGrp="1"/>
-          </p:cNvSpPr>
-          <p:nvPr>
-            <p:ph type="title"/>
-          </p:nvPr>
-        </p:nvSpPr>
-        <p:spPr>
-          <a:xfrm>
-            <a:off x="560798" y="457199"/>
-            <a:ext cx="4211227" cy="1936679"/>
-          </a:xfrm>
-        </p:spPr>
-        <p:txBody>
-          <a:bodyPr anchor="b">
-            <a:noAutofit/>
-          </a:bodyPr>
-          <a:lstStyle>
-            <a:lvl1pPr>
-              <a:defRPr sz="4000"/>
-            </a:lvl1pPr>
-          </a:lstStyle>
-          <a:p>
-            <a:r>
-              <a:rPr lang="en-US" smtClean="0"/>
-              <a:t>Click to edit Master title style</a:t>
-            </a:r>
-            <a:endParaRPr lang="en-US"/>
-          </a:p>
-        </p:txBody>
-      </p:sp>
-      <p:sp>
-        <p:nvSpPr>
-          <p:cNvPr id="3" name="Content Placeholder 2"/>
-          <p:cNvSpPr>
-            <a:spLocks noGrp="1"/>
-          </p:cNvSpPr>
-          <p:nvPr>
-            <p:ph idx="1"/>
-          </p:nvPr>
-        </p:nvSpPr>
-        <p:spPr>
-          <a:xfrm>
-            <a:off x="5183188" y="987425"/>
-            <a:ext cx="6457432" cy="4873625"/>
-          </a:xfrm>
-        </p:spPr>
-        <p:txBody>
-          <a:bodyPr/>
-          <a:lstStyle>
-            <a:lvl1pPr>
-              <a:defRPr sz="3200">
-                <a:latin typeface="+mj-lt"/>
-              </a:defRPr>
-            </a:lvl1pPr>
-            <a:lvl2pPr>
-              <a:defRPr sz="2800">
-                <a:latin typeface="+mj-lt"/>
-              </a:defRPr>
-            </a:lvl2pPr>
-            <a:lvl3pPr>
-              <a:defRPr sz="2400">
-                <a:latin typeface="+mj-lt"/>
-              </a:defRPr>
-            </a:lvl3pPr>
-            <a:lvl4pPr>
-              <a:defRPr sz="2000">
-                <a:latin typeface="+mj-lt"/>
-              </a:defRPr>
-            </a:lvl4pPr>
-            <a:lvl5pPr>
-              <a:defRPr sz="2000">
-                <a:latin typeface="+mj-lt"/>
-              </a:defRPr>
-            </a:lvl5pPr>
-            <a:lvl6pPr>
-              <a:defRPr sz="2000"/>
-            </a:lvl6pPr>
-            <a:lvl7pPr>
-              <a:defRPr sz="2000"/>
-            </a:lvl7pPr>
-            <a:lvl8pPr>
-              <a:defRPr sz="2000"/>
-            </a:lvl8pPr>
-            <a:lvl9pPr>
-              <a:defRPr sz="2000"/>
-            </a:lvl9pPr>
-          </a:lstStyle>
-          <a:p>
-            <a:pPr lvl="0"/>
-            <a:r>
-              <a:rPr lang="en-US" smtClean="0"/>
-              <a:t>Click to edit Master text styles</a:t>
-            </a:r>
-          </a:p>
-          <a:p>
-            <a:pPr lvl="1"/>
-            <a:r>
-              <a:rPr lang="en-US" smtClean="0"/>
-              <a:t>Second level</a:t>
-            </a:r>
-          </a:p>
-          <a:p>
-            <a:pPr lvl="2"/>
-            <a:r>
-              <a:rPr lang="en-US" smtClean="0"/>
-              <a:t>Third level</a:t>
-            </a:r>
-          </a:p>
-          <a:p>
-            <a:pPr lvl="3"/>
-            <a:r>
-              <a:rPr lang="en-US" smtClean="0"/>
-              <a:t>Fourth level</a:t>
-            </a:r>
-          </a:p>
-          <a:p>
-            <a:pPr lvl="4"/>
-            <a:r>
-              <a:rPr lang="en-US" smtClean="0"/>
-              <a:t>Fifth level</a:t>
-            </a:r>
-            <a:endParaRPr lang="en-US"/>
-          </a:p>
-        </p:txBody>
-      </p:sp>
-      <p:sp>
-        <p:nvSpPr>
-          <p:cNvPr id="4" name="Text Placeholder 3"/>
-          <p:cNvSpPr>
-            <a:spLocks noGrp="1"/>
-          </p:cNvSpPr>
-          <p:nvPr>
-            <p:ph type="body" sz="half" idx="2"/>
-          </p:nvPr>
-        </p:nvSpPr>
-        <p:spPr>
-          <a:xfrm>
-            <a:off x="560798" y="2604070"/>
-            <a:ext cx="4211227" cy="3264917"/>
-          </a:xfrm>
-        </p:spPr>
-        <p:txBody>
-          <a:bodyPr>
-            <a:normAutofit/>
-          </a:bodyPr>
-          <a:lstStyle>
-            <a:lvl1pPr marL="0" indent="0">
-              <a:buNone/>
-              <a:defRPr sz="2000"/>
-            </a:lvl1pPr>
-            <a:lvl2pPr marL="457200" indent="0">
-              <a:buNone/>
-              <a:defRPr sz="1400"/>
-            </a:lvl2pPr>
-            <a:lvl3pPr marL="914400" indent="0">
-              <a:buNone/>
-              <a:defRPr sz="1200"/>
-            </a:lvl3pPr>
-            <a:lvl4pPr marL="1371600" indent="0">
-              <a:buNone/>
-              <a:defRPr sz="1000"/>
-            </a:lvl4pPr>
-            <a:lvl5pPr marL="1828800" indent="0">
-              <a:buNone/>
-              <a:defRPr sz="1000"/>
-            </a:lvl5pPr>
-            <a:lvl6pPr marL="2286000" indent="0">
-              <a:buNone/>
-              <a:defRPr sz="1000"/>
-            </a:lvl6pPr>
-            <a:lvl7pPr marL="2743200" indent="0">
-              <a:buNone/>
-              <a:defRPr sz="1000"/>
-            </a:lvl7pPr>
-            <a:lvl8pPr marL="3200400" indent="0">
-              <a:buNone/>
-              <a:defRPr sz="1000"/>
-            </a:lvl8pPr>
-            <a:lvl9pPr marL="3657600" indent="0">
-              <a:buNone/>
-              <a:defRPr sz="1000"/>
-            </a:lvl9pPr>
-          </a:lstStyle>
-          <a:p>
-            <a:pPr lvl="0"/>
-            <a:r>
-              <a:rPr lang="en-US" smtClean="0"/>
-              <a:t>Click to edit Master text styles</a:t>
-            </a:r>
-          </a:p>
-        </p:txBody>
-      </p:sp>
-    </p:spTree>
-    <p:extLst>
-      <p:ext uri="{BB962C8B-B14F-4D97-AF65-F5344CB8AC3E}">
-        <p14:creationId xmlns:p14="http://schemas.microsoft.com/office/powerpoint/2010/main" val="3579493188"/>
       </p:ext>
     </p:extLst>
   </p:cSld>
@@ -31282,7 +31411,7 @@
           <p:nvPr/>
         </p:nvPicPr>
         <p:blipFill>
-          <a:blip r:embed="rId14"/>
+          <a:blip r:embed="rId15"/>
           <a:stretch>
             <a:fillRect/>
           </a:stretch>
@@ -31640,6 +31769,7 @@
     <p:sldLayoutId id="2147483747" r:id="rId10"/>
     <p:sldLayoutId id="2147483748" r:id="rId11"/>
     <p:sldLayoutId id="2147483749" r:id="rId12"/>
+    <p:sldLayoutId id="2147483790" r:id="rId13"/>
   </p:sldLayoutIdLst>
   <p:timing>
     <p:tnLst>
@@ -39745,6 +39875,66 @@
           <a:lstStyle/>
           <a:p>
             <a:r>
+              <a:rPr lang="en-US" dirty="0"/>
+              <a:t>Install and update Node packages through the Node Package Manager</a:t>
+            </a:r>
+            <a:endParaRPr lang="en-US" dirty="0"/>
+          </a:p>
+        </p:txBody>
+      </p:sp>
+    </p:spTree>
+    <p:extLst>
+      <p:ext uri="{BB962C8B-B14F-4D97-AF65-F5344CB8AC3E}">
+        <p14:creationId xmlns:p14="http://schemas.microsoft.com/office/powerpoint/2010/main" val="1397016543"/>
+      </p:ext>
+    </p:extLst>
+  </p:cSld>
+  <p:clrMapOvr>
+    <a:masterClrMapping/>
+  </p:clrMapOvr>
+  <p:timing>
+    <p:tnLst>
+      <p:par>
+        <p:cTn id="1" dur="indefinite" restart="never" nodeType="tmRoot"/>
+      </p:par>
+    </p:tnLst>
+  </p:timing>
+</p:sld>
+</file>
+
+<file path=ppt/slides/slide38.xml><?xml version="1.0" encoding="utf-8"?>
+<p:sld xmlns:a="http://schemas.openxmlformats.org/drawingml/2006/main" xmlns:r="http://schemas.openxmlformats.org/officeDocument/2006/relationships" xmlns:p="http://schemas.openxmlformats.org/presentationml/2006/main">
+  <p:cSld>
+    <p:spTree>
+      <p:nvGrpSpPr>
+        <p:cNvPr id="1" name=""/>
+        <p:cNvGrpSpPr/>
+        <p:nvPr/>
+      </p:nvGrpSpPr>
+      <p:grpSpPr>
+        <a:xfrm>
+          <a:off x="0" y="0"/>
+          <a:ext cx="0" cy="0"/>
+          <a:chOff x="0" y="0"/>
+          <a:chExt cx="0" cy="0"/>
+        </a:xfrm>
+      </p:grpSpPr>
+      <p:sp>
+        <p:nvSpPr>
+          <p:cNvPr id="2" name="Title 1"/>
+          <p:cNvSpPr>
+            <a:spLocks noGrp="1"/>
+          </p:cNvSpPr>
+          <p:nvPr>
+            <p:ph type="title"/>
+          </p:nvPr>
+        </p:nvSpPr>
+        <p:spPr/>
+        <p:txBody>
+          <a:bodyPr/>
+          <a:lstStyle/>
+          <a:p>
+            <a:r>
               <a:rPr lang="en-US" dirty="0" smtClean="0"/>
               <a:t>Resources </a:t>
             </a:r>
@@ -39836,7 +40026,7 @@
 </p:sld>
 </file>
 
-<file path=ppt/slides/slide38.xml><?xml version="1.0" encoding="utf-8"?>
+<file path=ppt/slides/slide39.xml><?xml version="1.0" encoding="utf-8"?>
 <p:sld xmlns:a="http://schemas.openxmlformats.org/drawingml/2006/main" xmlns:r="http://schemas.openxmlformats.org/officeDocument/2006/relationships" xmlns:p="http://schemas.openxmlformats.org/presentationml/2006/main">
   <p:cSld>
     <p:spTree>
@@ -43875,15 +44065,6 @@
 </file>
 
 <file path=customXml/item1.xml><?xml version="1.0" encoding="utf-8"?>
-<?mso-contentType ?>
-<FormTemplates xmlns="http://schemas.microsoft.com/sharepoint/v3/contenttype/forms">
-  <Display>DocumentLibraryForm</Display>
-  <Edit>DocumentLibraryForm</Edit>
-  <New>DocumentLibraryForm</New>
-</FormTemplates>
-</file>
-
-<file path=customXml/item2.xml><?xml version="1.0" encoding="utf-8"?>
 <p:properties xmlns:p="http://schemas.microsoft.com/office/2006/metadata/properties" xmlns:xsi="http://www.w3.org/2001/XMLSchema-instance" xmlns:pc="http://schemas.microsoft.com/office/infopath/2007/PartnerControls">
   <documentManagement>
     <SharedWithUsers xmlns="636b0322-90fb-440c-9cbc-22749e7231e9">
@@ -43897,7 +44078,7 @@
 </p:properties>
 </file>
 
-<file path=customXml/item3.xml><?xml version="1.0" encoding="utf-8"?>
+<file path=customXml/item2.xml><?xml version="1.0" encoding="utf-8"?>
 <ct:contentTypeSchema xmlns:ct="http://schemas.microsoft.com/office/2006/metadata/contentType" xmlns:ma="http://schemas.microsoft.com/office/2006/metadata/properties/metaAttributes" ct:_="" ma:_="" ma:contentTypeName="Document" ma:contentTypeID="0x010100391E57C78B9F604FB8BAD296D1460E2A" ma:contentTypeVersion="1" ma:contentTypeDescription="Create a new document." ma:contentTypeScope="" ma:versionID="fb382fe2362acd2155f454904f478e4d">
   <xsd:schema xmlns:xsd="http://www.w3.org/2001/XMLSchema" xmlns:xs="http://www.w3.org/2001/XMLSchema" xmlns:p="http://schemas.microsoft.com/office/2006/metadata/properties" xmlns:ns3="636b0322-90fb-440c-9cbc-22749e7231e9" targetNamespace="http://schemas.microsoft.com/office/2006/metadata/properties" ma:root="true" ma:fieldsID="b9887c63ce4710c1aeb75a5f03aecb69" ns3:_="">
     <xsd:import namespace="636b0322-90fb-440c-9cbc-22749e7231e9"/>
@@ -44037,15 +44218,16 @@
 </ct:contentTypeSchema>
 </file>
 
-<file path=customXml/itemProps1.xml><?xml version="1.0" encoding="utf-8"?>
-<ds:datastoreItem xmlns:ds="http://schemas.openxmlformats.org/officeDocument/2006/customXml" ds:itemID="{B0CA13EC-1D3C-4D6F-8D1C-E8A452CFC79A}">
-  <ds:schemaRefs>
-    <ds:schemaRef ds:uri="http://schemas.microsoft.com/sharepoint/v3/contenttype/forms"/>
-  </ds:schemaRefs>
-</ds:datastoreItem>
+<file path=customXml/item3.xml><?xml version="1.0" encoding="utf-8"?>
+<?mso-contentType ?>
+<FormTemplates xmlns="http://schemas.microsoft.com/sharepoint/v3/contenttype/forms">
+  <Display>DocumentLibraryForm</Display>
+  <Edit>DocumentLibraryForm</Edit>
+  <New>DocumentLibraryForm</New>
+</FormTemplates>
 </file>
 
-<file path=customXml/itemProps2.xml><?xml version="1.0" encoding="utf-8"?>
+<file path=customXml/itemProps1.xml><?xml version="1.0" encoding="utf-8"?>
 <ds:datastoreItem xmlns:ds="http://schemas.openxmlformats.org/officeDocument/2006/customXml" ds:itemID="{7025FDD9-4C58-4084-9F89-0E6ADD6FFF55}">
   <ds:schemaRefs>
     <ds:schemaRef ds:uri="http://purl.org/dc/terms/"/>
@@ -44061,7 +44243,7 @@
 </ds:datastoreItem>
 </file>
 
-<file path=customXml/itemProps3.xml><?xml version="1.0" encoding="utf-8"?>
+<file path=customXml/itemProps2.xml><?xml version="1.0" encoding="utf-8"?>
 <ds:datastoreItem xmlns:ds="http://schemas.openxmlformats.org/officeDocument/2006/customXml" ds:itemID="{7B70CE0C-0988-423A-BF66-B40F6A1061FF}">
   <ds:schemaRefs>
     <ds:schemaRef ds:uri="http://schemas.microsoft.com/office/2006/metadata/contentType"/>
@@ -44077,4 +44259,12 @@
     <ds:schemaRef ds:uri="http://schemas.microsoft.com/internal/obd"/>
   </ds:schemaRefs>
 </ds:datastoreItem>
+</file>
+
+<file path=customXml/itemProps3.xml><?xml version="1.0" encoding="utf-8"?>
+<ds:datastoreItem xmlns:ds="http://schemas.openxmlformats.org/officeDocument/2006/customXml" ds:itemID="{B0CA13EC-1D3C-4D6F-8D1C-E8A452CFC79A}">
+  <ds:schemaRefs>
+    <ds:schemaRef ds:uri="http://schemas.microsoft.com/sharepoint/v3/contenttype/forms"/>
+  </ds:schemaRefs>
+</ds:datastoreItem>
 </file>
</xml_diff>

<commit_message>
Removed all unnecessary files (used bower package instead)
</commit_message>
<xml_diff>
--- a/Presentation/IntroToNodeJS/IntroToNodeJS.pptx
+++ b/Presentation/IntroToNodeJS/IntroToNodeJS.pptx
@@ -265,7 +265,7 @@
           <a:p>
             <a:fld id="{312E7B4A-039C-48A2-9B2C-AF16AA3873D8}" type="datetimeFigureOut">
               <a:rPr lang="en-US" smtClean="0"/>
-              <a:t>7/22/2015</a:t>
+              <a:t>19/01/2016</a:t>
             </a:fld>
             <a:endParaRPr lang="en-US"/>
           </a:p>
@@ -430,7 +430,7 @@
           <a:p>
             <a:fld id="{DA005A0C-54D9-45AA-87D4-C551D08DFCE1}" type="datetimeFigureOut">
               <a:rPr lang="en-US" smtClean="0"/>
-              <a:t>7/22/2015</a:t>
+              <a:t>19/01/2016</a:t>
             </a:fld>
             <a:endParaRPr lang="en-US"/>
           </a:p>
@@ -39878,7 +39878,6 @@
               <a:rPr lang="en-US" dirty="0"/>
               <a:t>Install and update Node packages through the Node Package Manager</a:t>
             </a:r>
-            <a:endParaRPr lang="en-US" dirty="0"/>
           </a:p>
         </p:txBody>
       </p:sp>
@@ -40266,17 +40265,17 @@
           <a:p>
             <a:r>
               <a:rPr lang="en-US" dirty="0" smtClean="0"/>
-              <a:t>Windows, Linux, Mac OSX</a:t>
-            </a:r>
-          </a:p>
-          <a:p>
-            <a:r>
-              <a:rPr lang="en-US" dirty="0" smtClean="0"/>
-              <a:t>Still in “beta” phase</a:t>
-            </a:r>
-          </a:p>
-          <a:p>
-            <a:endParaRPr lang="en-US" dirty="0"/>
+              <a:t>Windows, Linux, </a:t>
+            </a:r>
+            <a:r>
+              <a:rPr lang="en-US" smtClean="0"/>
+              <a:t>Mac </a:t>
+            </a:r>
+            <a:r>
+              <a:rPr lang="en-US" smtClean="0"/>
+              <a:t>OSX</a:t>
+            </a:r>
+            <a:endParaRPr lang="en-US" dirty="0" smtClean="0"/>
           </a:p>
         </p:txBody>
       </p:sp>
@@ -44065,20 +44064,6 @@
 </file>
 
 <file path=customXml/item1.xml><?xml version="1.0" encoding="utf-8"?>
-<p:properties xmlns:p="http://schemas.microsoft.com/office/2006/metadata/properties" xmlns:xsi="http://www.w3.org/2001/XMLSchema-instance" xmlns:pc="http://schemas.microsoft.com/office/infopath/2007/PartnerControls">
-  <documentManagement>
-    <SharedWithUsers xmlns="636b0322-90fb-440c-9cbc-22749e7231e9">
-      <UserInfo>
-        <DisplayName>Christopher Harrison</DisplayName>
-        <AccountId>123</AccountId>
-        <AccountType/>
-      </UserInfo>
-    </SharedWithUsers>
-  </documentManagement>
-</p:properties>
-</file>
-
-<file path=customXml/item2.xml><?xml version="1.0" encoding="utf-8"?>
 <ct:contentTypeSchema xmlns:ct="http://schemas.microsoft.com/office/2006/metadata/contentType" xmlns:ma="http://schemas.microsoft.com/office/2006/metadata/properties/metaAttributes" ct:_="" ma:_="" ma:contentTypeName="Document" ma:contentTypeID="0x010100391E57C78B9F604FB8BAD296D1460E2A" ma:contentTypeVersion="1" ma:contentTypeDescription="Create a new document." ma:contentTypeScope="" ma:versionID="fb382fe2362acd2155f454904f478e4d">
   <xsd:schema xmlns:xsd="http://www.w3.org/2001/XMLSchema" xmlns:xs="http://www.w3.org/2001/XMLSchema" xmlns:p="http://schemas.microsoft.com/office/2006/metadata/properties" xmlns:ns3="636b0322-90fb-440c-9cbc-22749e7231e9" targetNamespace="http://schemas.microsoft.com/office/2006/metadata/properties" ma:root="true" ma:fieldsID="b9887c63ce4710c1aeb75a5f03aecb69" ns3:_="">
     <xsd:import namespace="636b0322-90fb-440c-9cbc-22749e7231e9"/>
@@ -44218,6 +44203,20 @@
 </ct:contentTypeSchema>
 </file>
 
+<file path=customXml/item2.xml><?xml version="1.0" encoding="utf-8"?>
+<p:properties xmlns:p="http://schemas.microsoft.com/office/2006/metadata/properties" xmlns:xsi="http://www.w3.org/2001/XMLSchema-instance" xmlns:pc="http://schemas.microsoft.com/office/infopath/2007/PartnerControls">
+  <documentManagement>
+    <SharedWithUsers xmlns="636b0322-90fb-440c-9cbc-22749e7231e9">
+      <UserInfo>
+        <DisplayName>Christopher Harrison</DisplayName>
+        <AccountId>123</AccountId>
+        <AccountType/>
+      </UserInfo>
+    </SharedWithUsers>
+  </documentManagement>
+</p:properties>
+</file>
+
 <file path=customXml/item3.xml><?xml version="1.0" encoding="utf-8"?>
 <?mso-contentType ?>
 <FormTemplates xmlns="http://schemas.microsoft.com/sharepoint/v3/contenttype/forms">
@@ -44228,22 +44227,6 @@
 </file>
 
 <file path=customXml/itemProps1.xml><?xml version="1.0" encoding="utf-8"?>
-<ds:datastoreItem xmlns:ds="http://schemas.openxmlformats.org/officeDocument/2006/customXml" ds:itemID="{7025FDD9-4C58-4084-9F89-0E6ADD6FFF55}">
-  <ds:schemaRefs>
-    <ds:schemaRef ds:uri="http://purl.org/dc/terms/"/>
-    <ds:schemaRef ds:uri="636b0322-90fb-440c-9cbc-22749e7231e9"/>
-    <ds:schemaRef ds:uri="http://schemas.microsoft.com/office/infopath/2007/PartnerControls"/>
-    <ds:schemaRef ds:uri="http://www.w3.org/XML/1998/namespace"/>
-    <ds:schemaRef ds:uri="http://schemas.microsoft.com/office/2006/documentManagement/types"/>
-    <ds:schemaRef ds:uri="http://schemas.openxmlformats.org/package/2006/metadata/core-properties"/>
-    <ds:schemaRef ds:uri="http://schemas.microsoft.com/office/2006/metadata/properties"/>
-    <ds:schemaRef ds:uri="http://purl.org/dc/dcmitype/"/>
-    <ds:schemaRef ds:uri="http://purl.org/dc/elements/1.1/"/>
-  </ds:schemaRefs>
-</ds:datastoreItem>
-</file>
-
-<file path=customXml/itemProps2.xml><?xml version="1.0" encoding="utf-8"?>
 <ds:datastoreItem xmlns:ds="http://schemas.openxmlformats.org/officeDocument/2006/customXml" ds:itemID="{7B70CE0C-0988-423A-BF66-B40F6A1061FF}">
   <ds:schemaRefs>
     <ds:schemaRef ds:uri="http://schemas.microsoft.com/office/2006/metadata/contentType"/>
@@ -44261,6 +44244,22 @@
 </ds:datastoreItem>
 </file>
 
+<file path=customXml/itemProps2.xml><?xml version="1.0" encoding="utf-8"?>
+<ds:datastoreItem xmlns:ds="http://schemas.openxmlformats.org/officeDocument/2006/customXml" ds:itemID="{7025FDD9-4C58-4084-9F89-0E6ADD6FFF55}">
+  <ds:schemaRefs>
+    <ds:schemaRef ds:uri="http://purl.org/dc/terms/"/>
+    <ds:schemaRef ds:uri="636b0322-90fb-440c-9cbc-22749e7231e9"/>
+    <ds:schemaRef ds:uri="http://schemas.microsoft.com/office/infopath/2007/PartnerControls"/>
+    <ds:schemaRef ds:uri="http://www.w3.org/XML/1998/namespace"/>
+    <ds:schemaRef ds:uri="http://schemas.microsoft.com/office/2006/documentManagement/types"/>
+    <ds:schemaRef ds:uri="http://schemas.openxmlformats.org/package/2006/metadata/core-properties"/>
+    <ds:schemaRef ds:uri="http://schemas.microsoft.com/office/2006/metadata/properties"/>
+    <ds:schemaRef ds:uri="http://purl.org/dc/dcmitype/"/>
+    <ds:schemaRef ds:uri="http://purl.org/dc/elements/1.1/"/>
+  </ds:schemaRefs>
+</ds:datastoreItem>
+</file>
+
 <file path=customXml/itemProps3.xml><?xml version="1.0" encoding="utf-8"?>
 <ds:datastoreItem xmlns:ds="http://schemas.openxmlformats.org/officeDocument/2006/customXml" ds:itemID="{B0CA13EC-1D3C-4D6F-8D1C-E8A452CFC79A}">
   <ds:schemaRefs>

</xml_diff>